<commit_message>
Update presentation and class diagram
</commit_message>
<xml_diff>
--- a/presentations/P3_presentation .pptx
+++ b/presentations/P3_presentation .pptx
@@ -7,9 +7,12 @@
   <p:sldIdLst>
     <p:sldId id="256" r:id="rId2"/>
     <p:sldId id="257" r:id="rId3"/>
-    <p:sldId id="262" r:id="rId4"/>
-    <p:sldId id="260" r:id="rId5"/>
-    <p:sldId id="261" r:id="rId6"/>
+    <p:sldId id="263" r:id="rId4"/>
+    <p:sldId id="264" r:id="rId5"/>
+    <p:sldId id="265" r:id="rId6"/>
+    <p:sldId id="266" r:id="rId7"/>
+    <p:sldId id="267" r:id="rId8"/>
+    <p:sldId id="268" r:id="rId9"/>
   </p:sldIdLst>
   <p:sldSz cx="12192000" cy="6858000"/>
   <p:notesSz cx="6858000" cy="9144000"/>
@@ -308,7 +311,7 @@
             <a:fld id="{B61BEF0D-F0BB-DE4B-95CE-6DB70DBA9567}" type="datetimeFigureOut">
               <a:rPr lang="en-US" dirty="0"/>
               <a:pPr/>
-              <a:t>10/29/2018</a:t>
+              <a:t>10/30/2018</a:t>
             </a:fld>
             <a:endParaRPr lang="en-US" dirty="0"/>
           </a:p>
@@ -741,7 +744,7 @@
             <a:fld id="{B61BEF0D-F0BB-DE4B-95CE-6DB70DBA9567}" type="datetimeFigureOut">
               <a:rPr lang="en-US" dirty="0"/>
               <a:pPr/>
-              <a:t>10/29/2018</a:t>
+              <a:t>10/30/2018</a:t>
             </a:fld>
             <a:endParaRPr lang="en-US" dirty="0"/>
           </a:p>
@@ -988,7 +991,7 @@
             <a:fld id="{B61BEF0D-F0BB-DE4B-95CE-6DB70DBA9567}" type="datetimeFigureOut">
               <a:rPr lang="en-US" dirty="0"/>
               <a:pPr/>
-              <a:t>10/29/2018</a:t>
+              <a:t>10/30/2018</a:t>
             </a:fld>
             <a:endParaRPr lang="en-US" dirty="0"/>
           </a:p>
@@ -1293,7 +1296,7 @@
             <a:fld id="{B61BEF0D-F0BB-DE4B-95CE-6DB70DBA9567}" type="datetimeFigureOut">
               <a:rPr lang="en-US" dirty="0"/>
               <a:pPr/>
-              <a:t>10/29/2018</a:t>
+              <a:t>10/30/2018</a:t>
             </a:fld>
             <a:endParaRPr lang="en-US" dirty="0"/>
           </a:p>
@@ -1608,7 +1611,7 @@
             <a:fld id="{B61BEF0D-F0BB-DE4B-95CE-6DB70DBA9567}" type="datetimeFigureOut">
               <a:rPr lang="en-US" dirty="0"/>
               <a:pPr/>
-              <a:t>10/29/2018</a:t>
+              <a:t>10/30/2018</a:t>
             </a:fld>
             <a:endParaRPr lang="en-US" dirty="0"/>
           </a:p>
@@ -1907,7 +1910,7 @@
             <a:fld id="{B61BEF0D-F0BB-DE4B-95CE-6DB70DBA9567}" type="datetimeFigureOut">
               <a:rPr lang="en-US" dirty="0"/>
               <a:pPr/>
-              <a:t>10/29/2018</a:t>
+              <a:t>10/30/2018</a:t>
             </a:fld>
             <a:endParaRPr lang="en-US" dirty="0"/>
           </a:p>
@@ -2271,7 +2274,7 @@
             <a:fld id="{B61BEF0D-F0BB-DE4B-95CE-6DB70DBA9567}" type="datetimeFigureOut">
               <a:rPr lang="en-US" dirty="0"/>
               <a:pPr/>
-              <a:t>10/29/2018</a:t>
+              <a:t>10/30/2018</a:t>
             </a:fld>
             <a:endParaRPr lang="en-US" dirty="0"/>
           </a:p>
@@ -2442,7 +2445,7 @@
             <a:fld id="{B61BEF0D-F0BB-DE4B-95CE-6DB70DBA9567}" type="datetimeFigureOut">
               <a:rPr lang="en-US" dirty="0"/>
               <a:pPr/>
-              <a:t>10/29/2018</a:t>
+              <a:t>10/30/2018</a:t>
             </a:fld>
             <a:endParaRPr lang="en-US" dirty="0"/>
           </a:p>
@@ -2619,7 +2622,7 @@
             <a:fld id="{B61BEF0D-F0BB-DE4B-95CE-6DB70DBA9567}" type="datetimeFigureOut">
               <a:rPr lang="en-US" dirty="0"/>
               <a:pPr/>
-              <a:t>10/29/2018</a:t>
+              <a:t>10/30/2018</a:t>
             </a:fld>
             <a:endParaRPr lang="en-US" dirty="0"/>
           </a:p>
@@ -2786,7 +2789,7 @@
             <a:fld id="{B61BEF0D-F0BB-DE4B-95CE-6DB70DBA9567}" type="datetimeFigureOut">
               <a:rPr lang="en-US" dirty="0"/>
               <a:pPr/>
-              <a:t>10/29/2018</a:t>
+              <a:t>10/30/2018</a:t>
             </a:fld>
             <a:endParaRPr lang="en-US" dirty="0"/>
           </a:p>
@@ -3033,7 +3036,7 @@
             <a:fld id="{B61BEF0D-F0BB-DE4B-95CE-6DB70DBA9567}" type="datetimeFigureOut">
               <a:rPr lang="en-US" dirty="0"/>
               <a:pPr/>
-              <a:t>10/29/2018</a:t>
+              <a:t>10/30/2018</a:t>
             </a:fld>
             <a:endParaRPr lang="en-US" dirty="0"/>
           </a:p>
@@ -3266,7 +3269,7 @@
             <a:fld id="{B61BEF0D-F0BB-DE4B-95CE-6DB70DBA9567}" type="datetimeFigureOut">
               <a:rPr lang="en-US" dirty="0"/>
               <a:pPr/>
-              <a:t>10/29/2018</a:t>
+              <a:t>10/30/2018</a:t>
             </a:fld>
             <a:endParaRPr lang="en-US" dirty="0"/>
           </a:p>
@@ -3645,7 +3648,7 @@
             <a:fld id="{B61BEF0D-F0BB-DE4B-95CE-6DB70DBA9567}" type="datetimeFigureOut">
               <a:rPr lang="en-US" dirty="0"/>
               <a:pPr/>
-              <a:t>10/29/2018</a:t>
+              <a:t>10/30/2018</a:t>
             </a:fld>
             <a:endParaRPr lang="en-US" dirty="0"/>
           </a:p>
@@ -3760,7 +3763,7 @@
             <a:fld id="{B61BEF0D-F0BB-DE4B-95CE-6DB70DBA9567}" type="datetimeFigureOut">
               <a:rPr lang="en-US" dirty="0"/>
               <a:pPr/>
-              <a:t>10/29/2018</a:t>
+              <a:t>10/30/2018</a:t>
             </a:fld>
             <a:endParaRPr lang="en-US" dirty="0"/>
           </a:p>
@@ -3852,7 +3855,7 @@
             <a:fld id="{B61BEF0D-F0BB-DE4B-95CE-6DB70DBA9567}" type="datetimeFigureOut">
               <a:rPr lang="en-US" dirty="0"/>
               <a:pPr/>
-              <a:t>10/29/2018</a:t>
+              <a:t>10/30/2018</a:t>
             </a:fld>
             <a:endParaRPr lang="en-US" dirty="0"/>
           </a:p>
@@ -4104,7 +4107,7 @@
             <a:fld id="{B61BEF0D-F0BB-DE4B-95CE-6DB70DBA9567}" type="datetimeFigureOut">
               <a:rPr lang="en-US" dirty="0"/>
               <a:pPr/>
-              <a:t>10/29/2018</a:t>
+              <a:t>10/30/2018</a:t>
             </a:fld>
             <a:endParaRPr lang="en-US" dirty="0"/>
           </a:p>
@@ -4384,7 +4387,7 @@
             <a:fld id="{B61BEF0D-F0BB-DE4B-95CE-6DB70DBA9567}" type="datetimeFigureOut">
               <a:rPr lang="en-US" dirty="0"/>
               <a:pPr/>
-              <a:t>10/29/2018</a:t>
+              <a:t>10/30/2018</a:t>
             </a:fld>
             <a:endParaRPr lang="en-US" dirty="0"/>
           </a:p>
@@ -4787,7 +4790,7 @@
             <a:fld id="{B61BEF0D-F0BB-DE4B-95CE-6DB70DBA9567}" type="datetimeFigureOut">
               <a:rPr lang="en-US" dirty="0"/>
               <a:pPr/>
-              <a:t>10/29/2018</a:t>
+              <a:t>10/30/2018</a:t>
             </a:fld>
             <a:endParaRPr lang="en-US" dirty="0"/>
           </a:p>
@@ -5334,7 +5337,12 @@
             <p:ph type="ctrTitle"/>
           </p:nvPr>
         </p:nvSpPr>
-        <p:spPr/>
+        <p:spPr>
+          <a:xfrm>
+            <a:off x="684212" y="637430"/>
+            <a:ext cx="8001000" cy="2590800"/>
+          </a:xfrm>
+        </p:spPr>
         <p:txBody>
           <a:bodyPr/>
           <a:lstStyle/>
@@ -5374,35 +5382,59 @@
           <a:lstStyle/>
           <a:p>
             <a:r>
-              <a:rPr lang="en-US" dirty="0"/>
-              <a:t>The ‘C’ Team</a:t>
-            </a:r>
-          </a:p>
-          <a:p>
-            <a:r>
-              <a:rPr lang="en-US" dirty="0"/>
+              <a:rPr lang="en-US" b="1" dirty="0">
+                <a:solidFill>
+                  <a:schemeClr val="tx1"/>
+                </a:solidFill>
+              </a:rPr>
+              <a:t>The ‘C’ Team:</a:t>
+            </a:r>
+          </a:p>
+          <a:p>
+            <a:r>
+              <a:rPr lang="en-US" dirty="0">
+                <a:solidFill>
+                  <a:schemeClr val="tx1"/>
+                </a:solidFill>
+              </a:rPr>
               <a:t>Jake Marrapode</a:t>
             </a:r>
           </a:p>
           <a:p>
             <a:r>
-              <a:rPr lang="en-US" dirty="0"/>
+              <a:rPr lang="en-US" dirty="0">
+                <a:solidFill>
+                  <a:schemeClr val="tx1"/>
+                </a:solidFill>
+              </a:rPr>
               <a:t>Ian Franklin</a:t>
             </a:r>
           </a:p>
           <a:p>
             <a:r>
-              <a:rPr lang="en-US" dirty="0"/>
+              <a:rPr lang="en-US" dirty="0">
+                <a:solidFill>
+                  <a:schemeClr val="tx1"/>
+                </a:solidFill>
+              </a:rPr>
               <a:t>Braiden Wells</a:t>
             </a:r>
           </a:p>
           <a:p>
             <a:r>
-              <a:rPr lang="en-US" dirty="0" err="1"/>
+              <a:rPr lang="en-US" dirty="0" err="1">
+                <a:solidFill>
+                  <a:schemeClr val="tx1"/>
+                </a:solidFill>
+              </a:rPr>
               <a:t>Saloni</a:t>
             </a:r>
             <a:r>
-              <a:rPr lang="en-US" dirty="0"/>
+              <a:rPr lang="en-US" dirty="0">
+                <a:solidFill>
+                  <a:schemeClr val="tx1"/>
+                </a:solidFill>
+              </a:rPr>
               <a:t> Choudhary</a:t>
             </a:r>
           </a:p>
@@ -5640,6 +5672,33 @@
 <file path=ppt/slides/slide3.xml><?xml version="1.0" encoding="utf-8"?>
 <p:sld xmlns:a="http://schemas.openxmlformats.org/drawingml/2006/main" xmlns:r="http://schemas.openxmlformats.org/officeDocument/2006/relationships" xmlns:p="http://schemas.openxmlformats.org/presentationml/2006/main">
   <p:cSld>
+    <p:bg>
+      <p:bgPr>
+        <a:gradFill rotWithShape="1">
+          <a:gsLst>
+            <a:gs pos="86000">
+              <a:schemeClr val="bg2">
+                <a:tint val="97000"/>
+                <a:hueMod val="92000"/>
+                <a:satMod val="169000"/>
+                <a:alpha val="90000"/>
+                <a:lumMod val="60000"/>
+                <a:lumOff val="40000"/>
+              </a:schemeClr>
+            </a:gs>
+            <a:gs pos="100000">
+              <a:schemeClr val="bg2">
+                <a:shade val="96000"/>
+                <a:satMod val="120000"/>
+                <a:lumMod val="90000"/>
+              </a:schemeClr>
+            </a:gs>
+          </a:gsLst>
+          <a:lin ang="6120000" scaled="1"/>
+        </a:gradFill>
+        <a:effectLst/>
+      </p:bgPr>
+    </p:bg>
     <p:spTree>
       <p:nvGrpSpPr>
         <p:cNvPr id="1" name=""/>
@@ -5687,35 +5746,45 @@
           </a:p>
         </p:txBody>
       </p:sp>
-      <p:sp>
-        <p:nvSpPr>
-          <p:cNvPr id="4" name="Content Placeholder 3">
+      <p:pic>
+        <p:nvPicPr>
+          <p:cNvPr id="7" name="Content Placeholder 6">
             <a:extLst>
               <a:ext uri="{FF2B5EF4-FFF2-40B4-BE49-F238E27FC236}">
-                <a16:creationId xmlns:a16="http://schemas.microsoft.com/office/drawing/2014/main" id="{2BC2052F-20DA-4036-B8B9-6396B960D72F}"/>
+                <a16:creationId xmlns:a16="http://schemas.microsoft.com/office/drawing/2014/main" id="{9C09037C-735C-4B7F-B881-8A2109700BD8}"/>
               </a:ext>
             </a:extLst>
           </p:cNvPr>
-          <p:cNvSpPr>
-            <a:spLocks noGrp="1"/>
-          </p:cNvSpPr>
+          <p:cNvPicPr>
+            <a:picLocks noGrp="1" noChangeAspect="1"/>
+          </p:cNvPicPr>
           <p:nvPr>
             <p:ph idx="1"/>
           </p:nvPr>
-        </p:nvSpPr>
-        <p:spPr/>
-        <p:txBody>
-          <a:bodyPr/>
-          <a:lstStyle/>
-          <a:p>
-            <a:endParaRPr lang="en-US" dirty="0"/>
-          </a:p>
-        </p:txBody>
-      </p:sp>
+        </p:nvPicPr>
+        <p:blipFill>
+          <a:blip r:embed="rId2">
+            <a:extLst>
+              <a:ext uri="{96DAC541-7B7A-43D3-8B79-37D633B846F1}">
+                <asvg:svgBlip xmlns:asvg="http://schemas.microsoft.com/office/drawing/2016/SVG/main" r:embed="rId3"/>
+              </a:ext>
+            </a:extLst>
+          </a:blip>
+          <a:stretch>
+            <a:fillRect/>
+          </a:stretch>
+        </p:blipFill>
+        <p:spPr>
+          <a:xfrm>
+            <a:off x="182879" y="0"/>
+            <a:ext cx="9679578" cy="6628284"/>
+          </a:xfrm>
+        </p:spPr>
+      </p:pic>
     </p:spTree>
     <p:extLst>
       <p:ext uri="{BB962C8B-B14F-4D97-AF65-F5344CB8AC3E}">
-        <p14:creationId xmlns:p14="http://schemas.microsoft.com/office/powerpoint/2010/main" val="3986200264"/>
+        <p14:creationId xmlns:p14="http://schemas.microsoft.com/office/powerpoint/2010/main" val="996531147"/>
       </p:ext>
     </p:extLst>
   </p:cSld>
@@ -5732,13 +5801,12 @@
       <p:bgPr>
         <a:gradFill rotWithShape="1">
           <a:gsLst>
-            <a:gs pos="69000">
+            <a:gs pos="76000">
               <a:schemeClr val="bg2">
                 <a:tint val="97000"/>
                 <a:hueMod val="92000"/>
                 <a:satMod val="169000"/>
-                <a:lumMod val="46000"/>
-                <a:lumOff val="54000"/>
+                <a:lumMod val="164000"/>
                 <a:alpha val="90000"/>
               </a:schemeClr>
             </a:gs>
@@ -5802,35 +5870,45 @@
           </a:p>
         </p:txBody>
       </p:sp>
-      <p:sp>
-        <p:nvSpPr>
-          <p:cNvPr id="4" name="Content Placeholder 3">
+      <p:pic>
+        <p:nvPicPr>
+          <p:cNvPr id="6" name="Content Placeholder 5">
             <a:extLst>
               <a:ext uri="{FF2B5EF4-FFF2-40B4-BE49-F238E27FC236}">
-                <a16:creationId xmlns:a16="http://schemas.microsoft.com/office/drawing/2014/main" id="{2BC2052F-20DA-4036-B8B9-6396B960D72F}"/>
+                <a16:creationId xmlns:a16="http://schemas.microsoft.com/office/drawing/2014/main" id="{29FA70FB-0CB1-4782-9534-8E35A6D3F4F2}"/>
               </a:ext>
             </a:extLst>
           </p:cNvPr>
-          <p:cNvSpPr>
-            <a:spLocks noGrp="1"/>
-          </p:cNvSpPr>
+          <p:cNvPicPr>
+            <a:picLocks noGrp="1" noChangeAspect="1"/>
+          </p:cNvPicPr>
           <p:nvPr>
             <p:ph idx="1"/>
           </p:nvPr>
-        </p:nvSpPr>
-        <p:spPr/>
-        <p:txBody>
-          <a:bodyPr/>
-          <a:lstStyle/>
-          <a:p>
-            <a:endParaRPr lang="en-US"/>
-          </a:p>
-        </p:txBody>
-      </p:sp>
+        </p:nvPicPr>
+        <p:blipFill>
+          <a:blip r:embed="rId2">
+            <a:extLst>
+              <a:ext uri="{96DAC541-7B7A-43D3-8B79-37D633B846F1}">
+                <asvg:svgBlip xmlns:asvg="http://schemas.microsoft.com/office/drawing/2016/SVG/main" r:embed="rId3"/>
+              </a:ext>
+            </a:extLst>
+          </a:blip>
+          <a:stretch>
+            <a:fillRect/>
+          </a:stretch>
+        </p:blipFill>
+        <p:spPr>
+          <a:xfrm>
+            <a:off x="397165" y="242133"/>
+            <a:ext cx="9328726" cy="5700889"/>
+          </a:xfrm>
+        </p:spPr>
+      </p:pic>
     </p:spTree>
     <p:extLst>
       <p:ext uri="{BB962C8B-B14F-4D97-AF65-F5344CB8AC3E}">
-        <p14:creationId xmlns:p14="http://schemas.microsoft.com/office/powerpoint/2010/main" val="1012995967"/>
+        <p14:creationId xmlns:p14="http://schemas.microsoft.com/office/powerpoint/2010/main" val="1210246691"/>
       </p:ext>
     </p:extLst>
   </p:cSld>
@@ -5847,13 +5925,12 @@
       <p:bgPr>
         <a:gradFill rotWithShape="1">
           <a:gsLst>
-            <a:gs pos="69000">
+            <a:gs pos="84000">
               <a:schemeClr val="bg2">
                 <a:tint val="97000"/>
                 <a:hueMod val="92000"/>
                 <a:satMod val="169000"/>
-                <a:lumMod val="46000"/>
-                <a:lumOff val="54000"/>
+                <a:lumMod val="164000"/>
                 <a:alpha val="90000"/>
               </a:schemeClr>
             </a:gs>
@@ -5917,35 +5994,379 @@
           </a:p>
         </p:txBody>
       </p:sp>
-      <p:sp>
-        <p:nvSpPr>
-          <p:cNvPr id="4" name="Content Placeholder 3">
+      <p:pic>
+        <p:nvPicPr>
+          <p:cNvPr id="7" name="Content Placeholder 6">
             <a:extLst>
               <a:ext uri="{FF2B5EF4-FFF2-40B4-BE49-F238E27FC236}">
-                <a16:creationId xmlns:a16="http://schemas.microsoft.com/office/drawing/2014/main" id="{2BC2052F-20DA-4036-B8B9-6396B960D72F}"/>
+                <a16:creationId xmlns:a16="http://schemas.microsoft.com/office/drawing/2014/main" id="{EFB911A8-E8AA-41F7-97EA-2CB3C94D8544}"/>
               </a:ext>
             </a:extLst>
           </p:cNvPr>
-          <p:cNvSpPr>
-            <a:spLocks noGrp="1"/>
-          </p:cNvSpPr>
+          <p:cNvPicPr>
+            <a:picLocks noGrp="1" noChangeAspect="1"/>
+          </p:cNvPicPr>
           <p:nvPr>
             <p:ph idx="1"/>
           </p:nvPr>
-        </p:nvSpPr>
-        <p:spPr/>
-        <p:txBody>
-          <a:bodyPr/>
-          <a:lstStyle/>
-          <a:p>
-            <a:endParaRPr lang="en-US"/>
-          </a:p>
-        </p:txBody>
-      </p:sp>
+        </p:nvPicPr>
+        <p:blipFill>
+          <a:blip r:embed="rId2">
+            <a:extLst>
+              <a:ext uri="{96DAC541-7B7A-43D3-8B79-37D633B846F1}">
+                <asvg:svgBlip xmlns:asvg="http://schemas.microsoft.com/office/drawing/2016/SVG/main" r:embed="rId3"/>
+              </a:ext>
+            </a:extLst>
+          </a:blip>
+          <a:stretch>
+            <a:fillRect/>
+          </a:stretch>
+        </p:blipFill>
+        <p:spPr>
+          <a:xfrm>
+            <a:off x="367363" y="110433"/>
+            <a:ext cx="7860145" cy="6474936"/>
+          </a:xfrm>
+        </p:spPr>
+      </p:pic>
     </p:spTree>
     <p:extLst>
       <p:ext uri="{BB962C8B-B14F-4D97-AF65-F5344CB8AC3E}">
-        <p14:creationId xmlns:p14="http://schemas.microsoft.com/office/powerpoint/2010/main" val="3608449035"/>
+        <p14:creationId xmlns:p14="http://schemas.microsoft.com/office/powerpoint/2010/main" val="660800383"/>
+      </p:ext>
+    </p:extLst>
+  </p:cSld>
+  <p:clrMapOvr>
+    <a:masterClrMapping/>
+  </p:clrMapOvr>
+</p:sld>
+</file>
+
+<file path=ppt/slides/slide6.xml><?xml version="1.0" encoding="utf-8"?>
+<p:sld xmlns:a="http://schemas.openxmlformats.org/drawingml/2006/main" xmlns:r="http://schemas.openxmlformats.org/officeDocument/2006/relationships" xmlns:p="http://schemas.openxmlformats.org/presentationml/2006/main">
+  <p:cSld>
+    <p:bg>
+      <p:bgPr>
+        <a:gradFill rotWithShape="1">
+          <a:gsLst>
+            <a:gs pos="84000">
+              <a:schemeClr val="bg2">
+                <a:tint val="97000"/>
+                <a:hueMod val="92000"/>
+                <a:satMod val="169000"/>
+                <a:lumMod val="164000"/>
+                <a:alpha val="90000"/>
+              </a:schemeClr>
+            </a:gs>
+            <a:gs pos="100000">
+              <a:schemeClr val="bg2">
+                <a:shade val="96000"/>
+                <a:satMod val="120000"/>
+                <a:lumMod val="90000"/>
+              </a:schemeClr>
+            </a:gs>
+          </a:gsLst>
+          <a:lin ang="6120000" scaled="1"/>
+        </a:gradFill>
+        <a:effectLst/>
+      </p:bgPr>
+    </p:bg>
+    <p:spTree>
+      <p:nvGrpSpPr>
+        <p:cNvPr id="1" name=""/>
+        <p:cNvGrpSpPr/>
+        <p:nvPr/>
+      </p:nvGrpSpPr>
+      <p:grpSpPr>
+        <a:xfrm>
+          <a:off x="0" y="0"/>
+          <a:ext cx="0" cy="0"/>
+          <a:chOff x="0" y="0"/>
+          <a:chExt cx="0" cy="0"/>
+        </a:xfrm>
+      </p:grpSpPr>
+      <p:sp>
+        <p:nvSpPr>
+          <p:cNvPr id="2" name="Title 1">
+            <a:extLst>
+              <a:ext uri="{FF2B5EF4-FFF2-40B4-BE49-F238E27FC236}">
+                <a16:creationId xmlns:a16="http://schemas.microsoft.com/office/drawing/2014/main" id="{B69C4CE6-3F2C-4F36-8C4D-1190A021A972}"/>
+              </a:ext>
+            </a:extLst>
+          </p:cNvPr>
+          <p:cNvSpPr>
+            <a:spLocks noGrp="1"/>
+          </p:cNvSpPr>
+          <p:nvPr>
+            <p:ph type="title"/>
+          </p:nvPr>
+        </p:nvSpPr>
+        <p:spPr>
+          <a:xfrm>
+            <a:off x="8200845" y="5619874"/>
+            <a:ext cx="3991155" cy="1507067"/>
+          </a:xfrm>
+        </p:spPr>
+        <p:txBody>
+          <a:bodyPr/>
+          <a:lstStyle/>
+          <a:p>
+            <a:r>
+              <a:rPr lang="en-US" dirty="0"/>
+              <a:t>Class diagram</a:t>
+            </a:r>
+          </a:p>
+        </p:txBody>
+      </p:sp>
+      <p:pic>
+        <p:nvPicPr>
+          <p:cNvPr id="6" name="Content Placeholder 5">
+            <a:extLst>
+              <a:ext uri="{FF2B5EF4-FFF2-40B4-BE49-F238E27FC236}">
+                <a16:creationId xmlns:a16="http://schemas.microsoft.com/office/drawing/2014/main" id="{A1847508-615D-47F6-B4FB-18C7742B7F60}"/>
+              </a:ext>
+            </a:extLst>
+          </p:cNvPr>
+          <p:cNvPicPr>
+            <a:picLocks noGrp="1" noChangeAspect="1"/>
+          </p:cNvPicPr>
+          <p:nvPr>
+            <p:ph idx="1"/>
+          </p:nvPr>
+        </p:nvPicPr>
+        <p:blipFill>
+          <a:blip r:embed="rId2">
+            <a:extLst>
+              <a:ext uri="{96DAC541-7B7A-43D3-8B79-37D633B846F1}">
+                <asvg:svgBlip xmlns:asvg="http://schemas.microsoft.com/office/drawing/2016/SVG/main" r:embed="rId3"/>
+              </a:ext>
+            </a:extLst>
+          </a:blip>
+          <a:stretch>
+            <a:fillRect/>
+          </a:stretch>
+        </p:blipFill>
+        <p:spPr>
+          <a:xfrm>
+            <a:off x="446048" y="0"/>
+            <a:ext cx="10550769" cy="5486400"/>
+          </a:xfrm>
+        </p:spPr>
+      </p:pic>
+    </p:spTree>
+    <p:extLst>
+      <p:ext uri="{BB962C8B-B14F-4D97-AF65-F5344CB8AC3E}">
+        <p14:creationId xmlns:p14="http://schemas.microsoft.com/office/powerpoint/2010/main" val="3906817547"/>
+      </p:ext>
+    </p:extLst>
+  </p:cSld>
+  <p:clrMapOvr>
+    <a:masterClrMapping/>
+  </p:clrMapOvr>
+</p:sld>
+</file>
+
+<file path=ppt/slides/slide7.xml><?xml version="1.0" encoding="utf-8"?>
+<p:sld xmlns:a="http://schemas.openxmlformats.org/drawingml/2006/main" xmlns:r="http://schemas.openxmlformats.org/officeDocument/2006/relationships" xmlns:p="http://schemas.openxmlformats.org/presentationml/2006/main">
+  <p:cSld>
+    <p:bg>
+      <p:bgPr>
+        <a:gradFill rotWithShape="1">
+          <a:gsLst>
+            <a:gs pos="4000">
+              <a:schemeClr val="bg2">
+                <a:tint val="97000"/>
+                <a:hueMod val="92000"/>
+                <a:satMod val="169000"/>
+                <a:lumMod val="46000"/>
+                <a:lumOff val="54000"/>
+              </a:schemeClr>
+            </a:gs>
+            <a:gs pos="100000">
+              <a:schemeClr val="bg2">
+                <a:shade val="96000"/>
+                <a:satMod val="120000"/>
+                <a:lumMod val="90000"/>
+              </a:schemeClr>
+            </a:gs>
+          </a:gsLst>
+          <a:lin ang="6120000" scaled="1"/>
+        </a:gradFill>
+        <a:effectLst/>
+      </p:bgPr>
+    </p:bg>
+    <p:spTree>
+      <p:nvGrpSpPr>
+        <p:cNvPr id="1" name=""/>
+        <p:cNvGrpSpPr/>
+        <p:nvPr/>
+      </p:nvGrpSpPr>
+      <p:grpSpPr>
+        <a:xfrm>
+          <a:off x="0" y="0"/>
+          <a:ext cx="0" cy="0"/>
+          <a:chOff x="0" y="0"/>
+          <a:chExt cx="0" cy="0"/>
+        </a:xfrm>
+      </p:grpSpPr>
+      <p:sp>
+        <p:nvSpPr>
+          <p:cNvPr id="2" name="Title 1">
+            <a:extLst>
+              <a:ext uri="{FF2B5EF4-FFF2-40B4-BE49-F238E27FC236}">
+                <a16:creationId xmlns:a16="http://schemas.microsoft.com/office/drawing/2014/main" id="{B69C4CE6-3F2C-4F36-8C4D-1190A021A972}"/>
+              </a:ext>
+            </a:extLst>
+          </p:cNvPr>
+          <p:cNvSpPr>
+            <a:spLocks noGrp="1"/>
+          </p:cNvSpPr>
+          <p:nvPr>
+            <p:ph type="title"/>
+          </p:nvPr>
+        </p:nvSpPr>
+        <p:spPr>
+          <a:xfrm>
+            <a:off x="3958683" y="5619874"/>
+            <a:ext cx="8233318" cy="1507067"/>
+          </a:xfrm>
+        </p:spPr>
+        <p:txBody>
+          <a:bodyPr/>
+          <a:lstStyle/>
+          <a:p>
+            <a:r>
+              <a:rPr lang="en-US" dirty="0"/>
+              <a:t>Sequence diagram: turn/Move</a:t>
+            </a:r>
+          </a:p>
+        </p:txBody>
+      </p:sp>
+      <p:pic>
+        <p:nvPicPr>
+          <p:cNvPr id="8" name="Content Placeholder 7">
+            <a:extLst>
+              <a:ext uri="{FF2B5EF4-FFF2-40B4-BE49-F238E27FC236}">
+                <a16:creationId xmlns:a16="http://schemas.microsoft.com/office/drawing/2014/main" id="{57F891A8-361F-41E9-9487-774C425A0AE4}"/>
+              </a:ext>
+            </a:extLst>
+          </p:cNvPr>
+          <p:cNvPicPr>
+            <a:picLocks noGrp="1" noChangeAspect="1"/>
+          </p:cNvPicPr>
+          <p:nvPr>
+            <p:ph idx="1"/>
+          </p:nvPr>
+        </p:nvPicPr>
+        <p:blipFill>
+          <a:blip r:embed="rId2"/>
+          <a:stretch>
+            <a:fillRect/>
+          </a:stretch>
+        </p:blipFill>
+        <p:spPr>
+          <a:xfrm>
+            <a:off x="992459" y="117280"/>
+            <a:ext cx="7393258" cy="5910476"/>
+          </a:xfrm>
+          <a:prstGeom prst="rect">
+            <a:avLst/>
+          </a:prstGeom>
+        </p:spPr>
+      </p:pic>
+    </p:spTree>
+    <p:extLst>
+      <p:ext uri="{BB962C8B-B14F-4D97-AF65-F5344CB8AC3E}">
+        <p14:creationId xmlns:p14="http://schemas.microsoft.com/office/powerpoint/2010/main" val="2745799194"/>
+      </p:ext>
+    </p:extLst>
+  </p:cSld>
+  <p:clrMapOvr>
+    <a:masterClrMapping/>
+  </p:clrMapOvr>
+</p:sld>
+</file>
+
+<file path=ppt/slides/slide8.xml><?xml version="1.0" encoding="utf-8"?>
+<p:sld xmlns:a="http://schemas.openxmlformats.org/drawingml/2006/main" xmlns:r="http://schemas.openxmlformats.org/officeDocument/2006/relationships" xmlns:p="http://schemas.openxmlformats.org/presentationml/2006/main">
+  <p:cSld>
+    <p:bg>
+      <p:bgPr>
+        <a:gradFill rotWithShape="1">
+          <a:gsLst>
+            <a:gs pos="4000">
+              <a:schemeClr val="bg2">
+                <a:tint val="97000"/>
+                <a:hueMod val="92000"/>
+                <a:satMod val="169000"/>
+                <a:lumMod val="46000"/>
+                <a:lumOff val="54000"/>
+              </a:schemeClr>
+            </a:gs>
+            <a:gs pos="100000">
+              <a:schemeClr val="bg2">
+                <a:shade val="96000"/>
+                <a:satMod val="120000"/>
+                <a:lumMod val="90000"/>
+              </a:schemeClr>
+            </a:gs>
+          </a:gsLst>
+          <a:lin ang="6120000" scaled="1"/>
+        </a:gradFill>
+        <a:effectLst/>
+      </p:bgPr>
+    </p:bg>
+    <p:spTree>
+      <p:nvGrpSpPr>
+        <p:cNvPr id="1" name=""/>
+        <p:cNvGrpSpPr/>
+        <p:nvPr/>
+      </p:nvGrpSpPr>
+      <p:grpSpPr>
+        <a:xfrm>
+          <a:off x="0" y="0"/>
+          <a:ext cx="0" cy="0"/>
+          <a:chOff x="0" y="0"/>
+          <a:chExt cx="0" cy="0"/>
+        </a:xfrm>
+      </p:grpSpPr>
+      <p:sp>
+        <p:nvSpPr>
+          <p:cNvPr id="2" name="Title 1">
+            <a:extLst>
+              <a:ext uri="{FF2B5EF4-FFF2-40B4-BE49-F238E27FC236}">
+                <a16:creationId xmlns:a16="http://schemas.microsoft.com/office/drawing/2014/main" id="{B69C4CE6-3F2C-4F36-8C4D-1190A021A972}"/>
+              </a:ext>
+            </a:extLst>
+          </p:cNvPr>
+          <p:cNvSpPr>
+            <a:spLocks noGrp="1"/>
+          </p:cNvSpPr>
+          <p:nvPr>
+            <p:ph type="title"/>
+          </p:nvPr>
+        </p:nvSpPr>
+        <p:spPr>
+          <a:xfrm>
+            <a:off x="3958683" y="5619874"/>
+            <a:ext cx="8233318" cy="1507067"/>
+          </a:xfrm>
+        </p:spPr>
+        <p:txBody>
+          <a:bodyPr/>
+          <a:lstStyle/>
+          <a:p>
+            <a:r>
+              <a:rPr lang="en-US" dirty="0"/>
+              <a:t>Game logic demo</a:t>
+            </a:r>
+          </a:p>
+        </p:txBody>
+      </p:sp>
+    </p:spTree>
+    <p:extLst>
+      <p:ext uri="{BB962C8B-B14F-4D97-AF65-F5344CB8AC3E}">
+        <p14:creationId xmlns:p14="http://schemas.microsoft.com/office/powerpoint/2010/main" val="1802916947"/>
       </p:ext>
     </p:extLst>
   </p:cSld>

</xml_diff>